<commit_message>
Updated chapter nine with deployment diagramm
</commit_message>
<xml_diff>
--- a/slides/chapter09.pptx
+++ b/slides/chapter09.pptx
@@ -6463,6 +6463,56 @@
       <p:sp>
         <p:nvSpPr>
           <p:cNvPr id="78" name="Google Shape;78;p17"/>
+          <p:cNvSpPr/>
+          <p:nvPr/>
+        </p:nvSpPr>
+        <p:spPr>
+          <a:xfrm>
+            <a:off x="3265775" y="3968900"/>
+            <a:ext cx="1461600" cy="965100"/>
+          </a:xfrm>
+          <a:prstGeom prst="rect">
+            <a:avLst/>
+          </a:prstGeom>
+          <a:solidFill>
+            <a:schemeClr val="lt2"/>
+          </a:solidFill>
+          <a:ln cap="flat" cmpd="sng" w="9525">
+            <a:solidFill>
+              <a:schemeClr val="dk2"/>
+            </a:solidFill>
+            <a:prstDash val="solid"/>
+            <a:round/>
+            <a:headEnd len="sm" w="sm" type="none"/>
+            <a:tailEnd len="sm" w="sm" type="none"/>
+          </a:ln>
+        </p:spPr>
+        <p:txBody>
+          <a:bodyPr anchorCtr="0" anchor="ctr" bIns="91425" lIns="91425" spcFirstLastPara="1" rIns="91425" wrap="square" tIns="91425">
+            <a:noAutofit/>
+          </a:bodyPr>
+          <a:lstStyle/>
+          <a:p>
+            <a:pPr indent="0" lvl="0" marL="0" rtl="0" algn="ctr">
+              <a:spcBef>
+                <a:spcPts val="0"/>
+              </a:spcBef>
+              <a:spcAft>
+                <a:spcPts val="0"/>
+              </a:spcAft>
+              <a:buNone/>
+            </a:pPr>
+            <a:r>
+              <a:rPr lang="sv"/>
+              <a:t>Movie service instance X</a:t>
+            </a:r>
+            <a:endParaRPr/>
+          </a:p>
+        </p:txBody>
+      </p:sp>
+      <p:sp>
+        <p:nvSpPr>
+          <p:cNvPr id="79" name="Google Shape;79;p17"/>
           <p:cNvSpPr txBox="1"/>
           <p:nvPr>
             <p:ph type="title"/>
@@ -6502,7 +6552,7 @@
       </p:sp>
       <p:sp>
         <p:nvSpPr>
-          <p:cNvPr id="79" name="Google Shape;79;p17"/>
+          <p:cNvPr id="80" name="Google Shape;80;p17"/>
           <p:cNvSpPr txBox="1"/>
           <p:nvPr>
             <p:ph idx="1" type="body"/>
@@ -6577,30 +6627,38 @@
       </p:sp>
       <p:sp>
         <p:nvSpPr>
-          <p:cNvPr id="80" name="Google Shape;80;p17"/>
-          <p:cNvSpPr txBox="1"/>
+          <p:cNvPr id="81" name="Google Shape;81;p17"/>
+          <p:cNvSpPr/>
           <p:nvPr/>
         </p:nvSpPr>
         <p:spPr>
           <a:xfrm>
-            <a:off x="2138900" y="3167000"/>
-            <a:ext cx="2951100" cy="753900"/>
+            <a:off x="704800" y="3212975"/>
+            <a:ext cx="1461600" cy="965100"/>
           </a:xfrm>
           <a:prstGeom prst="rect">
             <a:avLst/>
           </a:prstGeom>
-          <a:noFill/>
-          <a:ln>
-            <a:noFill/>
+          <a:solidFill>
+            <a:schemeClr val="lt2"/>
+          </a:solidFill>
+          <a:ln cap="flat" cmpd="sng" w="9525">
+            <a:solidFill>
+              <a:schemeClr val="dk2"/>
+            </a:solidFill>
+            <a:prstDash val="solid"/>
+            <a:round/>
+            <a:headEnd len="sm" w="sm" type="none"/>
+            <a:tailEnd len="sm" w="sm" type="none"/>
           </a:ln>
         </p:spPr>
         <p:txBody>
-          <a:bodyPr anchorCtr="0" anchor="t" bIns="91425" lIns="91425" spcFirstLastPara="1" rIns="91425" wrap="square" tIns="91425">
+          <a:bodyPr anchorCtr="0" anchor="ctr" bIns="91425" lIns="91425" spcFirstLastPara="1" rIns="91425" wrap="square" tIns="91425">
             <a:noAutofit/>
           </a:bodyPr>
           <a:lstStyle/>
           <a:p>
-            <a:pPr indent="0" lvl="0" marL="0" rtl="0" algn="l">
+            <a:pPr indent="0" lvl="0" marL="0" rtl="0" algn="ctr">
               <a:spcBef>
                 <a:spcPts val="0"/>
               </a:spcBef>
@@ -6611,12 +6669,234 @@
             </a:pPr>
             <a:r>
               <a:rPr lang="sv"/>
-              <a:t>insert beautiful diagram of the deployment setup</a:t>
+              <a:t>Load balancer</a:t>
             </a:r>
             <a:endParaRPr/>
           </a:p>
         </p:txBody>
       </p:sp>
+      <p:sp>
+        <p:nvSpPr>
+          <p:cNvPr id="82" name="Google Shape;82;p17"/>
+          <p:cNvSpPr/>
+          <p:nvPr/>
+        </p:nvSpPr>
+        <p:spPr>
+          <a:xfrm>
+            <a:off x="3265775" y="2791475"/>
+            <a:ext cx="1461600" cy="965100"/>
+          </a:xfrm>
+          <a:prstGeom prst="rect">
+            <a:avLst/>
+          </a:prstGeom>
+          <a:solidFill>
+            <a:schemeClr val="lt2"/>
+          </a:solidFill>
+          <a:ln cap="flat" cmpd="sng" w="9525">
+            <a:solidFill>
+              <a:schemeClr val="dk2"/>
+            </a:solidFill>
+            <a:prstDash val="solid"/>
+            <a:round/>
+            <a:headEnd len="sm" w="sm" type="none"/>
+            <a:tailEnd len="sm" w="sm" type="none"/>
+          </a:ln>
+        </p:spPr>
+        <p:txBody>
+          <a:bodyPr anchorCtr="0" anchor="ctr" bIns="91425" lIns="91425" spcFirstLastPara="1" rIns="91425" wrap="square" tIns="91425">
+            <a:noAutofit/>
+          </a:bodyPr>
+          <a:lstStyle/>
+          <a:p>
+            <a:pPr indent="0" lvl="0" marL="0" rtl="0" algn="ctr">
+              <a:spcBef>
+                <a:spcPts val="0"/>
+              </a:spcBef>
+              <a:spcAft>
+                <a:spcPts val="0"/>
+              </a:spcAft>
+              <a:buNone/>
+            </a:pPr>
+            <a:r>
+              <a:rPr lang="sv"/>
+              <a:t>Movie service</a:t>
+            </a:r>
+            <a:br>
+              <a:rPr lang="sv"/>
+            </a:br>
+            <a:r>
+              <a:rPr lang="sv"/>
+              <a:t>instance A</a:t>
+            </a:r>
+            <a:endParaRPr/>
+          </a:p>
+        </p:txBody>
+      </p:sp>
+      <p:sp>
+        <p:nvSpPr>
+          <p:cNvPr id="83" name="Google Shape;83;p17"/>
+          <p:cNvSpPr/>
+          <p:nvPr/>
+        </p:nvSpPr>
+        <p:spPr>
+          <a:xfrm>
+            <a:off x="6215975" y="3069750"/>
+            <a:ext cx="1213500" cy="1086725"/>
+          </a:xfrm>
+          <a:prstGeom prst="flowChartMagneticDisk">
+            <a:avLst/>
+          </a:prstGeom>
+          <a:solidFill>
+            <a:schemeClr val="lt2"/>
+          </a:solidFill>
+          <a:ln cap="flat" cmpd="sng" w="9525">
+            <a:solidFill>
+              <a:schemeClr val="dk2"/>
+            </a:solidFill>
+            <a:prstDash val="solid"/>
+            <a:round/>
+            <a:headEnd len="sm" w="sm" type="none"/>
+            <a:tailEnd len="sm" w="sm" type="none"/>
+          </a:ln>
+        </p:spPr>
+        <p:txBody>
+          <a:bodyPr anchorCtr="0" anchor="ctr" bIns="91425" lIns="91425" spcFirstLastPara="1" rIns="91425" wrap="square" tIns="91425">
+            <a:noAutofit/>
+          </a:bodyPr>
+          <a:lstStyle/>
+          <a:p>
+            <a:pPr indent="0" lvl="0" marL="0" rtl="0" algn="ctr">
+              <a:spcBef>
+                <a:spcPts val="0"/>
+              </a:spcBef>
+              <a:spcAft>
+                <a:spcPts val="0"/>
+              </a:spcAft>
+              <a:buNone/>
+            </a:pPr>
+            <a:r>
+              <a:rPr lang="sv"/>
+              <a:t>DynamoDB</a:t>
+            </a:r>
+            <a:endParaRPr/>
+          </a:p>
+        </p:txBody>
+      </p:sp>
+      <p:cxnSp>
+        <p:nvCxnSpPr>
+          <p:cNvPr id="84" name="Google Shape;84;p17"/>
+          <p:cNvCxnSpPr>
+            <a:stCxn id="81" idx="3"/>
+            <a:endCxn id="82" idx="1"/>
+          </p:cNvCxnSpPr>
+          <p:nvPr/>
+        </p:nvCxnSpPr>
+        <p:spPr>
+          <a:xfrm flipH="1" rot="10800000">
+            <a:off x="2166400" y="3274025"/>
+            <a:ext cx="1099500" cy="421500"/>
+          </a:xfrm>
+          <a:prstGeom prst="straightConnector1">
+            <a:avLst/>
+          </a:prstGeom>
+          <a:noFill/>
+          <a:ln cap="flat" cmpd="sng" w="9525">
+            <a:solidFill>
+              <a:schemeClr val="dk2"/>
+            </a:solidFill>
+            <a:prstDash val="solid"/>
+            <a:round/>
+            <a:headEnd len="med" w="med" type="none"/>
+            <a:tailEnd len="med" w="med" type="triangle"/>
+          </a:ln>
+        </p:spPr>
+      </p:cxnSp>
+      <p:cxnSp>
+        <p:nvCxnSpPr>
+          <p:cNvPr id="85" name="Google Shape;85;p17"/>
+          <p:cNvCxnSpPr>
+            <a:stCxn id="81" idx="3"/>
+            <a:endCxn id="78" idx="1"/>
+          </p:cNvCxnSpPr>
+          <p:nvPr/>
+        </p:nvCxnSpPr>
+        <p:spPr>
+          <a:xfrm>
+            <a:off x="2166400" y="3695525"/>
+            <a:ext cx="1099500" cy="756000"/>
+          </a:xfrm>
+          <a:prstGeom prst="straightConnector1">
+            <a:avLst/>
+          </a:prstGeom>
+          <a:noFill/>
+          <a:ln cap="flat" cmpd="sng" w="9525">
+            <a:solidFill>
+              <a:schemeClr val="dk2"/>
+            </a:solidFill>
+            <a:prstDash val="solid"/>
+            <a:round/>
+            <a:headEnd len="med" w="med" type="none"/>
+            <a:tailEnd len="med" w="med" type="triangle"/>
+          </a:ln>
+        </p:spPr>
+      </p:cxnSp>
+      <p:cxnSp>
+        <p:nvCxnSpPr>
+          <p:cNvPr id="86" name="Google Shape;86;p17"/>
+          <p:cNvCxnSpPr>
+            <a:stCxn id="78" idx="3"/>
+            <a:endCxn id="83" idx="2"/>
+          </p:cNvCxnSpPr>
+          <p:nvPr/>
+        </p:nvCxnSpPr>
+        <p:spPr>
+          <a:xfrm flipH="1" rot="10800000">
+            <a:off x="4727375" y="3613250"/>
+            <a:ext cx="1488600" cy="838200"/>
+          </a:xfrm>
+          <a:prstGeom prst="straightConnector1">
+            <a:avLst/>
+          </a:prstGeom>
+          <a:noFill/>
+          <a:ln cap="flat" cmpd="sng" w="9525">
+            <a:solidFill>
+              <a:schemeClr val="dk2"/>
+            </a:solidFill>
+            <a:prstDash val="solid"/>
+            <a:round/>
+            <a:headEnd len="med" w="med" type="none"/>
+            <a:tailEnd len="med" w="med" type="triangle"/>
+          </a:ln>
+        </p:spPr>
+      </p:cxnSp>
+      <p:cxnSp>
+        <p:nvCxnSpPr>
+          <p:cNvPr id="87" name="Google Shape;87;p17"/>
+          <p:cNvCxnSpPr>
+            <a:endCxn id="83" idx="2"/>
+          </p:cNvCxnSpPr>
+          <p:nvPr/>
+        </p:nvCxnSpPr>
+        <p:spPr>
+          <a:xfrm>
+            <a:off x="4727375" y="3274112"/>
+            <a:ext cx="1488600" cy="339000"/>
+          </a:xfrm>
+          <a:prstGeom prst="straightConnector1">
+            <a:avLst/>
+          </a:prstGeom>
+          <a:noFill/>
+          <a:ln cap="flat" cmpd="sng" w="9525">
+            <a:solidFill>
+              <a:schemeClr val="dk2"/>
+            </a:solidFill>
+            <a:prstDash val="solid"/>
+            <a:round/>
+            <a:headEnd len="med" w="med" type="none"/>
+            <a:tailEnd len="med" w="med" type="triangle"/>
+          </a:ln>
+        </p:spPr>
+      </p:cxnSp>
     </p:spTree>
   </p:cSld>
   <p:clrMapOvr>

</xml_diff>